<commit_message>
update sec() under S256Point
</commit_message>
<xml_diff>
--- a/programming bitcoin.pptx
+++ b/programming bitcoin.pptx
@@ -5593,7 +5593,7 @@
         <p:spPr>
           <a:xfrm>
             <a:off x="3143560" y="4891394"/>
-            <a:ext cx="4809995" cy="369332"/>
+            <a:ext cx="3369207" cy="646331"/>
           </a:xfrm>
           <a:prstGeom prst="rect">
             <a:avLst/>
@@ -5658,7 +5658,7 @@
         </p:nvSpPr>
         <p:spPr>
           <a:xfrm>
-            <a:off x="7299702" y="2045776"/>
+            <a:off x="7396729" y="937360"/>
             <a:ext cx="785793" cy="369332"/>
           </a:xfrm>
           <a:prstGeom prst="rect">
@@ -5684,6 +5684,36 @@
           </a:p>
         </p:txBody>
       </p:sp>
+      <p:pic>
+        <p:nvPicPr>
+          <p:cNvPr id="12" name="Picture 11">
+            <a:extLst>
+              <a:ext uri="{FF2B5EF4-FFF2-40B4-BE49-F238E27FC236}">
+                <a16:creationId xmlns:a16="http://schemas.microsoft.com/office/drawing/2014/main" id="{0BE7921D-B757-4331-F66C-F7DFB9A4EA8C}"/>
+              </a:ext>
+            </a:extLst>
+          </p:cNvPr>
+          <p:cNvPicPr>
+            <a:picLocks noChangeAspect="1"/>
+          </p:cNvPicPr>
+          <p:nvPr/>
+        </p:nvPicPr>
+        <p:blipFill>
+          <a:blip r:embed="rId2"/>
+          <a:stretch>
+            <a:fillRect/>
+          </a:stretch>
+        </p:blipFill>
+        <p:spPr>
+          <a:xfrm>
+            <a:off x="7791141" y="1807573"/>
+            <a:ext cx="3762504" cy="3351724"/>
+          </a:xfrm>
+          <a:prstGeom prst="rect">
+            <a:avLst/>
+          </a:prstGeom>
+        </p:spPr>
+      </p:pic>
     </p:spTree>
     <p:extLst>
       <p:ext uri="{BB962C8B-B14F-4D97-AF65-F5344CB8AC3E}">
@@ -7715,7 +7745,7 @@
           <a:p>
             <a:r>
               <a:rPr lang="en-US" sz="2000" b="1" dirty="0"/>
-              <a:t>Eclipse curve</a:t>
+              <a:t>Serialization </a:t>
             </a:r>
             <a:endParaRPr lang="en-CN" sz="2000" b="1" dirty="0"/>
           </a:p>

</xml_diff>